<commit_message>
Backend updates, documentation cleanup, and test infrastructure
- Remove obsolete documentation markdown files
- Update lambda functions: batch_expander, book_builder, images_gen, lab_planner
- Update deployment scripts and layer build configurations
- Add test infrastructure: pytest, test files, test results
- Add CI/CD workflow configuration
- Update requirements and dependencies
- Add deployment guides and documentation
- Add layer-build directory with dependencies
- Include test output and weather module
- Update template.yaml with latest configurations
</commit_message>
<xml_diff>
--- a/CG-Backend/test_mixed_images.pptx
+++ b/CG-Backend/test_mixed_images.pptx
@@ -3250,12 +3250,20 @@
           </a:p>
         </p:txBody>
       </p:sp>
-      <p:sp>
-        <p:nvSpPr>
-          <p:cNvPr id="4" name="Rectangle 3"/>
-          <p:cNvSpPr/>
+      <p:pic>
+        <p:nvPicPr>
+          <p:cNvPr id="4" name="aurora_placeholder" descr="image.png"/>
+          <p:cNvPicPr>
+            <a:picLocks noChangeAspect="1"/>
+          </p:cNvPicPr>
           <p:nvPr/>
-        </p:nvSpPr>
+        </p:nvPicPr>
+        <p:blipFill>
+          <a:blip r:embed="rId2"/>
+          <a:stretch>
+            <a:fillRect/>
+          </a:stretch>
+        </p:blipFill>
         <p:spPr>
           <a:xfrm>
             <a:off x="1828800" y="1828800"/>
@@ -3264,46 +3272,8 @@
           <a:prstGeom prst="rect">
             <a:avLst/>
           </a:prstGeom>
-          <a:solidFill>
-            <a:srgbClr val="FFFFFF"/>
-          </a:solidFill>
-          <a:ln w="38100">
-            <a:solidFill>
-              <a:srgbClr val="4472C4"/>
-            </a:solidFill>
-          </a:ln>
         </p:spPr>
-        <p:style>
-          <a:lnRef idx="1">
-            <a:schemeClr val="accent1"/>
-          </a:lnRef>
-          <a:fillRef idx="3">
-            <a:schemeClr val="accent1"/>
-          </a:fillRef>
-          <a:effectRef idx="2">
-            <a:schemeClr val="accent1"/>
-          </a:effectRef>
-          <a:fontRef idx="minor">
-            <a:schemeClr val="lt1"/>
-          </a:fontRef>
-        </p:style>
-        <p:txBody>
-          <a:bodyPr rtlCol="0" anchor="ctr"/>
-          <a:lstStyle/>
-          <a:p>
-            <a:pPr algn="ctr">
-              <a:defRPr sz="3200">
-                <a:solidFill>
-                  <a:srgbClr val="4472C4"/>
-                </a:solidFill>
-              </a:defRPr>
-            </a:pPr>
-            <a:r>
-              <a:t>📊 Diagram</a:t>
-            </a:r>
-          </a:p>
-        </p:txBody>
-      </p:sp>
+      </p:pic>
       <p:sp>
         <p:nvSpPr>
           <p:cNvPr id="5" name="TextBox 4"/>
@@ -3432,12 +3402,20 @@
           </a:p>
         </p:txBody>
       </p:sp>
-      <p:sp>
-        <p:nvSpPr>
-          <p:cNvPr id="4" name="Rectangle 3"/>
-          <p:cNvSpPr/>
+      <p:pic>
+        <p:nvPicPr>
+          <p:cNvPr id="4" name="aurora_placeholder" descr="image.png"/>
+          <p:cNvPicPr>
+            <a:picLocks noChangeAspect="1"/>
+          </p:cNvPicPr>
           <p:nvPr/>
-        </p:nvSpPr>
+        </p:nvPicPr>
+        <p:blipFill>
+          <a:blip r:embed="rId2"/>
+          <a:stretch>
+            <a:fillRect/>
+          </a:stretch>
+        </p:blipFill>
         <p:spPr>
           <a:xfrm>
             <a:off x="1828800" y="1828800"/>
@@ -3446,46 +3424,8 @@
           <a:prstGeom prst="rect">
             <a:avLst/>
           </a:prstGeom>
-          <a:solidFill>
-            <a:srgbClr val="FFFFFF"/>
-          </a:solidFill>
-          <a:ln w="38100">
-            <a:solidFill>
-              <a:srgbClr val="4472C4"/>
-            </a:solidFill>
-          </a:ln>
         </p:spPr>
-        <p:style>
-          <a:lnRef idx="1">
-            <a:schemeClr val="accent1"/>
-          </a:lnRef>
-          <a:fillRef idx="3">
-            <a:schemeClr val="accent1"/>
-          </a:fillRef>
-          <a:effectRef idx="2">
-            <a:schemeClr val="accent1"/>
-          </a:effectRef>
-          <a:fontRef idx="minor">
-            <a:schemeClr val="lt1"/>
-          </a:fontRef>
-        </p:style>
-        <p:txBody>
-          <a:bodyPr rtlCol="0" anchor="ctr"/>
-          <a:lstStyle/>
-          <a:p>
-            <a:pPr algn="ctr">
-              <a:defRPr sz="3200">
-                <a:solidFill>
-                  <a:srgbClr val="4472C4"/>
-                </a:solidFill>
-              </a:defRPr>
-            </a:pPr>
-            <a:r>
-              <a:t>📊 Diagram</a:t>
-            </a:r>
-          </a:p>
-        </p:txBody>
-      </p:sp>
+      </p:pic>
       <p:sp>
         <p:nvSpPr>
           <p:cNvPr id="5" name="TextBox 4"/>

</xml_diff>